<commit_message>
SharePoint Saturday NYC Slides
</commit_message>
<xml_diff>
--- a/Matfess - Art of Building Business Solutions.pptx
+++ b/Matfess - Art of Building Business Solutions.pptx
@@ -24066,7 +24066,7 @@
                 </a:ln>
                 <a:extLst>
                   <a:ext uri="{91240B29-F687-4f45-9708-019B960494DF}">
-                    <a14:hiddenLine xmlns:a14="http://schemas.microsoft.com/office/drawing/2010/main" xmlns="" w="9525">
+                    <a14:hiddenLine xmlns="" xmlns:a14="http://schemas.microsoft.com/office/drawing/2010/main" w="9525">
                       <a:solidFill>
                         <a:srgbClr val="000000"/>
                       </a:solidFill>
@@ -24117,7 +24117,7 @@
                 </a:ln>
                 <a:extLst>
                   <a:ext uri="{91240B29-F687-4f45-9708-019B960494DF}">
-                    <a14:hiddenLine xmlns:a14="http://schemas.microsoft.com/office/drawing/2010/main" xmlns="" w="9525">
+                    <a14:hiddenLine xmlns="" xmlns:a14="http://schemas.microsoft.com/office/drawing/2010/main" w="9525">
                       <a:solidFill>
                         <a:srgbClr val="000000"/>
                       </a:solidFill>
@@ -24546,7 +24546,7 @@
                 </a:ln>
                 <a:extLst>
                   <a:ext uri="{91240B29-F687-4f45-9708-019B960494DF}">
-                    <a14:hiddenLine xmlns:a14="http://schemas.microsoft.com/office/drawing/2010/main" xmlns="" w="9525">
+                    <a14:hiddenLine xmlns="" xmlns:a14="http://schemas.microsoft.com/office/drawing/2010/main" w="9525">
                       <a:solidFill>
                         <a:srgbClr val="000000"/>
                       </a:solidFill>
@@ -24680,7 +24680,7 @@
                 </a:ln>
                 <a:extLst>
                   <a:ext uri="{91240B29-F687-4f45-9708-019B960494DF}">
-                    <a14:hiddenLine xmlns:a14="http://schemas.microsoft.com/office/drawing/2010/main" xmlns="" w="9525">
+                    <a14:hiddenLine xmlns="" xmlns:a14="http://schemas.microsoft.com/office/drawing/2010/main" w="9525">
                       <a:solidFill>
                         <a:srgbClr val="000000"/>
                       </a:solidFill>
@@ -25609,7 +25609,7 @@
           <a:noFill/>
           <a:extLst>
             <a:ext uri="{909E8E84-426E-40dd-AFC4-6F175D3DCCD1}">
-              <a14:hiddenFill xmlns:a14="http://schemas.microsoft.com/office/drawing/2010/main" xmlns="">
+              <a14:hiddenFill xmlns="" xmlns:a14="http://schemas.microsoft.com/office/drawing/2010/main">
                 <a:solidFill>
                   <a:srgbClr val="FFFFFF"/>
                 </a:solidFill>
@@ -27688,7 +27688,7 @@
           <a:noFill/>
           <a:extLst>
             <a:ext uri="{909E8E84-426E-40dd-AFC4-6F175D3DCCD1}">
-              <a14:hiddenFill xmlns:a14="http://schemas.microsoft.com/office/drawing/2010/main" xmlns="">
+              <a14:hiddenFill xmlns="" xmlns:a14="http://schemas.microsoft.com/office/drawing/2010/main">
                 <a:solidFill>
                   <a:srgbClr val="FFFFFF"/>
                 </a:solidFill>
@@ -27729,7 +27729,7 @@
           <a:noFill/>
           <a:extLst>
             <a:ext uri="{909E8E84-426E-40dd-AFC4-6F175D3DCCD1}">
-              <a14:hiddenFill xmlns:a14="http://schemas.microsoft.com/office/drawing/2010/main" xmlns="">
+              <a14:hiddenFill xmlns="" xmlns:a14="http://schemas.microsoft.com/office/drawing/2010/main">
                 <a:solidFill>
                   <a:srgbClr val="FFFFFF"/>
                 </a:solidFill>
@@ -27936,7 +27936,7 @@
             </a:ln>
             <a:extLst>
               <a:ext uri="{91240B29-F687-4f45-9708-019B960494DF}">
-                <a14:hiddenLine xmlns:a14="http://schemas.microsoft.com/office/drawing/2010/main" xmlns="" w="9525">
+                <a14:hiddenLine xmlns="" xmlns:a14="http://schemas.microsoft.com/office/drawing/2010/main" w="9525">
                   <a:solidFill>
                     <a:srgbClr val="000000"/>
                   </a:solidFill>
@@ -28159,7 +28159,7 @@
             </a:ln>
             <a:extLst>
               <a:ext uri="{91240B29-F687-4f45-9708-019B960494DF}">
-                <a14:hiddenLine xmlns:a14="http://schemas.microsoft.com/office/drawing/2010/main" xmlns="" w="9525">
+                <a14:hiddenLine xmlns="" xmlns:a14="http://schemas.microsoft.com/office/drawing/2010/main" w="9525">
                   <a:solidFill>
                     <a:srgbClr val="000000"/>
                   </a:solidFill>
@@ -28392,7 +28392,7 @@
             </a:ln>
             <a:extLst>
               <a:ext uri="{91240B29-F687-4f45-9708-019B960494DF}">
-                <a14:hiddenLine xmlns:a14="http://schemas.microsoft.com/office/drawing/2010/main" xmlns="" w="9525">
+                <a14:hiddenLine xmlns="" xmlns:a14="http://schemas.microsoft.com/office/drawing/2010/main" w="9525">
                   <a:solidFill>
                     <a:srgbClr val="000000"/>
                   </a:solidFill>
@@ -28615,7 +28615,7 @@
             </a:ln>
             <a:extLst>
               <a:ext uri="{91240B29-F687-4f45-9708-019B960494DF}">
-                <a14:hiddenLine xmlns:a14="http://schemas.microsoft.com/office/drawing/2010/main" xmlns="" w="9525">
+                <a14:hiddenLine xmlns="" xmlns:a14="http://schemas.microsoft.com/office/drawing/2010/main" w="9525">
                   <a:solidFill>
                     <a:srgbClr val="000000"/>
                   </a:solidFill>
@@ -28838,7 +28838,7 @@
             </a:ln>
             <a:extLst>
               <a:ext uri="{91240B29-F687-4f45-9708-019B960494DF}">
-                <a14:hiddenLine xmlns:a14="http://schemas.microsoft.com/office/drawing/2010/main" xmlns="" w="9525">
+                <a14:hiddenLine xmlns="" xmlns:a14="http://schemas.microsoft.com/office/drawing/2010/main" w="9525">
                   <a:solidFill>
                     <a:srgbClr val="000000"/>
                   </a:solidFill>
@@ -29469,7 +29469,7 @@
             </a:ln>
             <a:extLst>
               <a:ext uri="{91240B29-F687-4f45-9708-019B960494DF}">
-                <a14:hiddenLine xmlns:a14="http://schemas.microsoft.com/office/drawing/2010/main" xmlns="" w="9525">
+                <a14:hiddenLine xmlns="" xmlns:a14="http://schemas.microsoft.com/office/drawing/2010/main" w="9525">
                   <a:solidFill>
                     <a:srgbClr val="000000"/>
                   </a:solidFill>
@@ -29922,7 +29922,7 @@
           <a:noFill/>
           <a:extLst>
             <a:ext uri="{909E8E84-426E-40dd-AFC4-6F175D3DCCD1}">
-              <a14:hiddenFill xmlns:a14="http://schemas.microsoft.com/office/drawing/2010/main" xmlns="">
+              <a14:hiddenFill xmlns="" xmlns:a14="http://schemas.microsoft.com/office/drawing/2010/main">
                 <a:solidFill>
                   <a:srgbClr val="FFFFFF"/>
                 </a:solidFill>
@@ -30089,7 +30089,7 @@
           <a:noFill/>
           <a:extLst>
             <a:ext uri="{909E8E84-426E-40dd-AFC4-6F175D3DCCD1}">
-              <a14:hiddenFill xmlns:a14="http://schemas.microsoft.com/office/drawing/2010/main" xmlns="">
+              <a14:hiddenFill xmlns="" xmlns:a14="http://schemas.microsoft.com/office/drawing/2010/main">
                 <a:solidFill>
                   <a:srgbClr val="FFFFFF"/>
                 </a:solidFill>
@@ -31258,7 +31258,7 @@
               <a:rPr lang="en-US" dirty="0" smtClean="0">
                 <a:hlinkClick r:id="rId2"/>
               </a:rPr>
-              <a:t>github.com/JaredMatfess/SPSBoston2015</a:t>
+              <a:t>github.com/JaredMatfess/SPSNYC2015</a:t>
             </a:r>
             <a:r>
               <a:rPr lang="en-US" dirty="0" smtClean="0"/>
@@ -34155,11 +34155,7 @@
             <a:pPr lvl="1"/>
             <a:r>
               <a:rPr lang="en-US" dirty="0" smtClean="0"/>
-              <a:t>My demo is </a:t>
-            </a:r>
-            <a:r>
-              <a:rPr lang="en-US" dirty="0" smtClean="0"/>
-              <a:t>on a 2013 instance running on AWS</a:t>
+              <a:t>My demo is on a 2013 instance running on AWS</a:t>
             </a:r>
             <a:br>
               <a:rPr lang="en-US" dirty="0" smtClean="0"/>
@@ -36078,18 +36074,18 @@
 </file>
 
 <file path=customXml/item1.xml><?xml version="1.0" encoding="utf-8"?>
+<p:properties xmlns:p="http://schemas.microsoft.com/office/2006/metadata/properties" xmlns:xsi="http://www.w3.org/2001/XMLSchema-instance" xmlns:pc="http://schemas.microsoft.com/office/infopath/2007/PartnerControls">
+  <documentManagement/>
+</p:properties>
+</file>
+
+<file path=customXml/item2.xml><?xml version="1.0" encoding="utf-8"?>
 <?mso-contentType ?>
 <FormTemplates xmlns="http://schemas.microsoft.com/sharepoint/v3/contenttype/forms">
   <Display>DocumentLibraryForm</Display>
   <Edit>DocumentLibraryForm</Edit>
   <New>DocumentLibraryForm</New>
 </FormTemplates>
-</file>
-
-<file path=customXml/item2.xml><?xml version="1.0" encoding="utf-8"?>
-<p:properties xmlns:p="http://schemas.microsoft.com/office/2006/metadata/properties" xmlns:xsi="http://www.w3.org/2001/XMLSchema-instance" xmlns:pc="http://schemas.microsoft.com/office/infopath/2007/PartnerControls">
-  <documentManagement/>
-</p:properties>
 </file>
 
 <file path=customXml/item3.xml><?xml version="1.0" encoding="utf-8"?>
@@ -36207,14 +36203,6 @@
 </file>
 
 <file path=customXml/itemProps1.xml><?xml version="1.0" encoding="utf-8"?>
-<ds:datastoreItem xmlns:ds="http://schemas.openxmlformats.org/officeDocument/2006/customXml" ds:itemID="{34511AA7-8D46-42C1-969B-5E843ADBDC40}">
-  <ds:schemaRefs>
-    <ds:schemaRef ds:uri="http://schemas.microsoft.com/sharepoint/v3/contenttype/forms"/>
-  </ds:schemaRefs>
-</ds:datastoreItem>
-</file>
-
-<file path=customXml/itemProps2.xml><?xml version="1.0" encoding="utf-8"?>
 <ds:datastoreItem xmlns:ds="http://schemas.openxmlformats.org/officeDocument/2006/customXml" ds:itemID="{310BA9E4-2DAA-49B9-9D9A-1DC7F9CCA4D9}">
   <ds:schemaRefs>
     <ds:schemaRef ds:uri="http://purl.org/dc/terms/"/>
@@ -36225,6 +36213,14 @@
     <ds:schemaRef ds:uri="http://schemas.microsoft.com/office/2006/metadata/properties"/>
     <ds:schemaRef ds:uri="http://www.w3.org/XML/1998/namespace"/>
     <ds:schemaRef ds:uri="http://purl.org/dc/dcmitype/"/>
+  </ds:schemaRefs>
+</ds:datastoreItem>
+</file>
+
+<file path=customXml/itemProps2.xml><?xml version="1.0" encoding="utf-8"?>
+<ds:datastoreItem xmlns:ds="http://schemas.openxmlformats.org/officeDocument/2006/customXml" ds:itemID="{34511AA7-8D46-42C1-969B-5E843ADBDC40}">
+  <ds:schemaRefs>
+    <ds:schemaRef ds:uri="http://schemas.microsoft.com/sharepoint/v3/contenttype/forms"/>
   </ds:schemaRefs>
 </ds:datastoreItem>
 </file>

</xml_diff>